<commit_message>
Updated as per meeting
</commit_message>
<xml_diff>
--- a/Capstone Project_Final_Group4_Lakshmi.pptx
+++ b/Capstone Project_Final_Group4_Lakshmi.pptx
@@ -4250,7 +4250,7 @@
           <a:p>
             <a:fld id="{3A073F19-701D-4FE0-BC46-E8E925D96D82}" type="datetimeFigureOut">
               <a:rPr lang="en-IN" smtClean="0"/>
-              <a:t>23/01/21</a:t>
+              <a:t>24/01/21</a:t>
             </a:fld>
             <a:endParaRPr lang="en-IN"/>
           </a:p>
@@ -4950,7 +4950,7 @@
             <a:fld id="{1D8BD707-D9CF-40AE-B4C6-C98DA3205C09}" type="datetimeFigureOut">
               <a:rPr lang="en-US" smtClean="0"/>
               <a:pPr/>
-              <a:t>1/23/21</a:t>
+              <a:t>1/24/21</a:t>
             </a:fld>
             <a:endParaRPr lang="en-US"/>
           </a:p>
@@ -5115,7 +5115,7 @@
             <a:fld id="{1D8BD707-D9CF-40AE-B4C6-C98DA3205C09}" type="datetimeFigureOut">
               <a:rPr lang="en-US" smtClean="0"/>
               <a:pPr/>
-              <a:t>1/23/21</a:t>
+              <a:t>1/24/21</a:t>
             </a:fld>
             <a:endParaRPr lang="en-US"/>
           </a:p>
@@ -5290,7 +5290,7 @@
             <a:fld id="{1D8BD707-D9CF-40AE-B4C6-C98DA3205C09}" type="datetimeFigureOut">
               <a:rPr lang="en-US" smtClean="0"/>
               <a:pPr/>
-              <a:t>1/23/21</a:t>
+              <a:t>1/24/21</a:t>
             </a:fld>
             <a:endParaRPr lang="en-US"/>
           </a:p>
@@ -5455,7 +5455,7 @@
             <a:fld id="{1D8BD707-D9CF-40AE-B4C6-C98DA3205C09}" type="datetimeFigureOut">
               <a:rPr lang="en-US" smtClean="0"/>
               <a:pPr/>
-              <a:t>1/23/21</a:t>
+              <a:t>1/24/21</a:t>
             </a:fld>
             <a:endParaRPr lang="en-US"/>
           </a:p>
@@ -5697,7 +5697,7 @@
             <a:fld id="{1D8BD707-D9CF-40AE-B4C6-C98DA3205C09}" type="datetimeFigureOut">
               <a:rPr lang="en-US" smtClean="0"/>
               <a:pPr/>
-              <a:t>1/23/21</a:t>
+              <a:t>1/24/21</a:t>
             </a:fld>
             <a:endParaRPr lang="en-US"/>
           </a:p>
@@ -5979,7 +5979,7 @@
             <a:fld id="{1D8BD707-D9CF-40AE-B4C6-C98DA3205C09}" type="datetimeFigureOut">
               <a:rPr lang="en-US" smtClean="0"/>
               <a:pPr/>
-              <a:t>1/23/21</a:t>
+              <a:t>1/24/21</a:t>
             </a:fld>
             <a:endParaRPr lang="en-US"/>
           </a:p>
@@ -6395,7 +6395,7 @@
             <a:fld id="{1D8BD707-D9CF-40AE-B4C6-C98DA3205C09}" type="datetimeFigureOut">
               <a:rPr lang="en-US" smtClean="0"/>
               <a:pPr/>
-              <a:t>1/23/21</a:t>
+              <a:t>1/24/21</a:t>
             </a:fld>
             <a:endParaRPr lang="en-US"/>
           </a:p>
@@ -6509,7 +6509,7 @@
             <a:fld id="{1D8BD707-D9CF-40AE-B4C6-C98DA3205C09}" type="datetimeFigureOut">
               <a:rPr lang="en-US" smtClean="0"/>
               <a:pPr/>
-              <a:t>1/23/21</a:t>
+              <a:t>1/24/21</a:t>
             </a:fld>
             <a:endParaRPr lang="en-US"/>
           </a:p>
@@ -6601,7 +6601,7 @@
             <a:fld id="{1D8BD707-D9CF-40AE-B4C6-C98DA3205C09}" type="datetimeFigureOut">
               <a:rPr lang="en-US" smtClean="0"/>
               <a:pPr/>
-              <a:t>1/23/21</a:t>
+              <a:t>1/24/21</a:t>
             </a:fld>
             <a:endParaRPr lang="en-US"/>
           </a:p>
@@ -6873,7 +6873,7 @@
             <a:fld id="{1D8BD707-D9CF-40AE-B4C6-C98DA3205C09}" type="datetimeFigureOut">
               <a:rPr lang="en-US" smtClean="0"/>
               <a:pPr/>
-              <a:t>1/23/21</a:t>
+              <a:t>1/24/21</a:t>
             </a:fld>
             <a:endParaRPr lang="en-US"/>
           </a:p>
@@ -7122,7 +7122,7 @@
             <a:fld id="{1D8BD707-D9CF-40AE-B4C6-C98DA3205C09}" type="datetimeFigureOut">
               <a:rPr lang="en-US" smtClean="0"/>
               <a:pPr/>
-              <a:t>1/23/21</a:t>
+              <a:t>1/24/21</a:t>
             </a:fld>
             <a:endParaRPr lang="en-US"/>
           </a:p>
@@ -7330,7 +7330,7 @@
             <a:fld id="{1D8BD707-D9CF-40AE-B4C6-C98DA3205C09}" type="datetimeFigureOut">
               <a:rPr lang="en-US" smtClean="0"/>
               <a:pPr/>
-              <a:t>1/23/21</a:t>
+              <a:t>1/24/21</a:t>
             </a:fld>
             <a:endParaRPr lang="en-US"/>
           </a:p>
@@ -8434,7 +8434,37 @@
             </a:r>
           </a:p>
           <a:p>
-            <a:endParaRPr lang="en-US" sz="2400" dirty="0"/>
+            <a:r>
+              <a:rPr lang="en-US" sz="2400" dirty="0"/>
+              <a:t>Reference: </a:t>
+            </a:r>
+          </a:p>
+          <a:p>
+            <a:pPr lvl="1"/>
+            <a:r>
+              <a:rPr lang="en-US" sz="2000" dirty="0">
+                <a:hlinkClick r:id="rId10"/>
+              </a:rPr>
+              <a:t>Forbes</a:t>
+            </a:r>
+            <a:r>
+              <a:rPr lang="en-US" sz="2000" dirty="0"/>
+              <a:t> Article - </a:t>
+            </a:r>
+            <a:r>
+              <a:rPr lang="en-IN" sz="2000" dirty="0"/>
+              <a:t>Cleaning Big Data: Most Time-Consuming, Least Enjoyable Data Science Task, Survey Says</a:t>
+            </a:r>
+          </a:p>
+          <a:p>
+            <a:pPr lvl="1"/>
+            <a:r>
+              <a:rPr lang="en-US" sz="2000" dirty="0">
+                <a:hlinkClick r:id="rId11"/>
+              </a:rPr>
+              <a:t>Dataversity</a:t>
+            </a:r>
+            <a:endParaRPr lang="en-US" sz="2000" dirty="0"/>
           </a:p>
         </p:txBody>
       </p:sp>
@@ -8975,7 +9005,7 @@
         <p:spPr>
           <a:xfrm>
             <a:off x="1219199" y="1638300"/>
-            <a:ext cx="15220187" cy="7786747"/>
+            <a:ext cx="15220187" cy="8648521"/>
           </a:xfrm>
           <a:prstGeom prst="rect">
             <a:avLst/>
@@ -9194,6 +9224,40 @@
                 <a:latin typeface="+mj-lt"/>
               </a:rPr>
               <a:t>Popularity of collections amongst listeners</a:t>
+            </a:r>
+          </a:p>
+          <a:p>
+            <a:pPr marL="514350" indent="-514350">
+              <a:buFont typeface="Arial" panose="020B0604020202020204" pitchFamily="34" charset="0"/>
+              <a:buChar char="•"/>
+            </a:pPr>
+            <a:r>
+              <a:rPr lang="en-IN" sz="2800" b="1" dirty="0">
+                <a:solidFill>
+                  <a:srgbClr val="9BBB59">
+                    <a:lumMod val="50000"/>
+                  </a:srgbClr>
+                </a:solidFill>
+                <a:latin typeface="+mj-lt"/>
+              </a:rPr>
+              <a:t>Creating a hybrid recommendation technique</a:t>
+            </a:r>
+          </a:p>
+          <a:p>
+            <a:pPr marL="514350" indent="-514350">
+              <a:buFont typeface="Arial" panose="020B0604020202020204" pitchFamily="34" charset="0"/>
+              <a:buChar char="•"/>
+            </a:pPr>
+            <a:r>
+              <a:rPr lang="en-IN" sz="2800" b="1" dirty="0">
+                <a:solidFill>
+                  <a:srgbClr val="9BBB59">
+                    <a:lumMod val="50000"/>
+                  </a:srgbClr>
+                </a:solidFill>
+                <a:latin typeface="+mj-lt"/>
+              </a:rPr>
+              <a:t>Data pipeline updates and model updates &amp; maintenance</a:t>
             </a:r>
           </a:p>
           <a:p>
@@ -9676,7 +9740,7 @@
               </a:lnSpc>
             </a:pPr>
             <a:r>
-              <a:rPr lang="en-US" sz="3500" spc="175">
+              <a:rPr lang="en-US" sz="3500" spc="175" dirty="0">
                 <a:solidFill>
                   <a:srgbClr val="FFFFFF"/>
                 </a:solidFill>
@@ -9752,7 +9816,7 @@
               </a:lnSpc>
             </a:pPr>
             <a:r>
-              <a:rPr lang="en-US" sz="3500" spc="175">
+              <a:rPr lang="en-US" sz="3500" spc="175" dirty="0">
                 <a:solidFill>
                   <a:srgbClr val="FFFFFF"/>
                 </a:solidFill>
@@ -9883,7 +9947,7 @@
         <p:spPr>
           <a:xfrm>
             <a:off x="4856291" y="5433827"/>
-            <a:ext cx="1998225" cy="869950"/>
+            <a:ext cx="1998225" cy="859210"/>
           </a:xfrm>
           <a:prstGeom prst="rect">
             <a:avLst/>
@@ -9901,13 +9965,13 @@
               </a:lnSpc>
             </a:pPr>
             <a:r>
-              <a:rPr lang="en-US" sz="2500" spc="125">
+              <a:rPr lang="en-US" sz="2500" spc="125" dirty="0">
                 <a:solidFill>
                   <a:srgbClr val="000000"/>
                 </a:solidFill>
                 <a:latin typeface="Aileron Regular"/>
               </a:rPr>
-              <a:t>Artist + Track Data</a:t>
+              <a:t>IMDb rating + Track Data</a:t>
             </a:r>
           </a:p>
         </p:txBody>
@@ -9993,8 +10057,8 @@
         </p:nvSpPr>
         <p:spPr>
           <a:xfrm>
-            <a:off x="8144888" y="5652902"/>
-            <a:ext cx="1998225" cy="431800"/>
+            <a:off x="8144131" y="5663617"/>
+            <a:ext cx="1998225" cy="410369"/>
           </a:xfrm>
           <a:prstGeom prst="rect">
             <a:avLst/>
@@ -10012,7 +10076,7 @@
               </a:lnSpc>
             </a:pPr>
             <a:r>
-              <a:rPr lang="en-US" sz="2500" spc="125">
+              <a:rPr lang="en-US" sz="2500" spc="125" dirty="0">
                 <a:solidFill>
                   <a:srgbClr val="000000"/>
                 </a:solidFill>
@@ -10402,7 +10466,7 @@
         <p:spPr>
           <a:xfrm>
             <a:off x="1251817" y="6527128"/>
-            <a:ext cx="2629977" cy="1463040"/>
+            <a:ext cx="2629977" cy="2432461"/>
           </a:xfrm>
           <a:prstGeom prst="rect">
             <a:avLst/>
@@ -10420,13 +10484,13 @@
               </a:lnSpc>
             </a:pPr>
             <a:r>
-              <a:rPr lang="en-US" sz="1600" spc="80">
+              <a:rPr lang="en-US" sz="1600" spc="80" dirty="0">
                 <a:solidFill>
                   <a:srgbClr val="191919"/>
                 </a:solidFill>
                 <a:latin typeface="Aileron Regular"/>
               </a:rPr>
-              <a:t>Original data set provided by GreatLearning Team as input</a:t>
+              <a:t>Original data set provided by Great Learning Team as input</a:t>
             </a:r>
           </a:p>
           <a:p>
@@ -10435,7 +10499,7 @@
                 <a:spcPts val="2399"/>
               </a:lnSpc>
             </a:pPr>
-            <a:endParaRPr lang="en-US" sz="1600" spc="80">
+            <a:endParaRPr lang="en-US" sz="1600" spc="80" dirty="0">
               <a:solidFill>
                 <a:srgbClr val="191919"/>
               </a:solidFill>
@@ -10445,16 +10509,61 @@
           <a:p>
             <a:pPr>
               <a:lnSpc>
-                <a:spcPts val="2400"/>
+                <a:spcPts val="2399"/>
               </a:lnSpc>
             </a:pPr>
-            <a:endParaRPr lang="en-US" sz="1600" spc="80">
+            <a:r>
+              <a:rPr lang="en-US" sz="1600" spc="80" dirty="0">
+                <a:solidFill>
+                  <a:srgbClr val="191919"/>
+                </a:solidFill>
+                <a:latin typeface="Aileron Regular"/>
+              </a:rPr>
+              <a:t>1 million songs data</a:t>
+            </a:r>
+          </a:p>
+          <a:p>
+            <a:pPr>
+              <a:lnSpc>
+                <a:spcPts val="2399"/>
+              </a:lnSpc>
+            </a:pPr>
+            <a:r>
+              <a:rPr lang="en-US" sz="1600" spc="80" dirty="0">
+                <a:solidFill>
+                  <a:srgbClr val="191919"/>
+                </a:solidFill>
+                <a:latin typeface="Aileron Regular"/>
+              </a:rPr>
+              <a:t>2 million play count data</a:t>
+            </a:r>
+          </a:p>
+          <a:p>
+            <a:pPr>
+              <a:lnSpc>
+                <a:spcPts val="2399"/>
+              </a:lnSpc>
+            </a:pPr>
+            <a:endParaRPr lang="en-US" sz="1600" spc="80" dirty="0">
               <a:solidFill>
                 <a:srgbClr val="191919"/>
               </a:solidFill>
               <a:latin typeface="Aileron Regular"/>
             </a:endParaRPr>
           </a:p>
+          <a:p>
+            <a:pPr>
+              <a:lnSpc>
+                <a:spcPts val="2400"/>
+              </a:lnSpc>
+            </a:pPr>
+            <a:endParaRPr lang="en-US" sz="1600" spc="80" dirty="0">
+              <a:solidFill>
+                <a:srgbClr val="191919"/>
+              </a:solidFill>
+              <a:latin typeface="Aileron Regular"/>
+            </a:endParaRPr>
+          </a:p>
         </p:txBody>
       </p:sp>
       <p:sp>
@@ -10466,7 +10575,7 @@
         <p:spPr>
           <a:xfrm>
             <a:off x="4613086" y="6527128"/>
-            <a:ext cx="2629977" cy="1167765"/>
+            <a:ext cx="2629977" cy="2124684"/>
           </a:xfrm>
           <a:prstGeom prst="rect">
             <a:avLst/>
@@ -10484,13 +10593,60 @@
               </a:lnSpc>
             </a:pPr>
             <a:r>
-              <a:rPr lang="en-US" sz="1599" spc="79">
+              <a:rPr lang="en-US" sz="1599" spc="79" dirty="0">
                 <a:solidFill>
                   <a:srgbClr val="191919"/>
                 </a:solidFill>
                 <a:latin typeface="Aileron Regular"/>
               </a:rPr>
-              <a:t>Add Track ID and Artist data from SQLite track_metadata.db </a:t>
+              <a:t>Add IMDb rating data with region split</a:t>
+            </a:r>
+          </a:p>
+          <a:p>
+            <a:pPr>
+              <a:lnSpc>
+                <a:spcPts val="2399"/>
+              </a:lnSpc>
+            </a:pPr>
+            <a:endParaRPr lang="en-US" sz="1599" spc="79" dirty="0">
+              <a:solidFill>
+                <a:srgbClr val="191919"/>
+              </a:solidFill>
+              <a:latin typeface="Aileron Regular"/>
+            </a:endParaRPr>
+          </a:p>
+          <a:p>
+            <a:pPr>
+              <a:lnSpc>
+                <a:spcPts val="2399"/>
+              </a:lnSpc>
+            </a:pPr>
+            <a:r>
+              <a:rPr lang="en-US" sz="1599" spc="79" dirty="0">
+                <a:solidFill>
+                  <a:srgbClr val="191919"/>
+                </a:solidFill>
+                <a:latin typeface="Aileron Regular"/>
+              </a:rPr>
+              <a:t>Add Track ID and Artist data from SQLite </a:t>
+            </a:r>
+            <a:r>
+              <a:rPr lang="en-US" sz="1599" spc="79" dirty="0" err="1">
+                <a:solidFill>
+                  <a:srgbClr val="191919"/>
+                </a:solidFill>
+                <a:latin typeface="Aileron Regular"/>
+              </a:rPr>
+              <a:t>track_metadata.db</a:t>
+            </a:r>
+            <a:r>
+              <a:rPr lang="en-US" sz="1599" spc="79" dirty="0">
+                <a:solidFill>
+                  <a:srgbClr val="191919"/>
+                </a:solidFill>
+                <a:latin typeface="Aileron Regular"/>
+              </a:rPr>
+              <a:t> </a:t>
             </a:r>
           </a:p>
           <a:p>
@@ -10499,7 +10655,7 @@
                 <a:spcPts val="2400"/>
               </a:lnSpc>
             </a:pPr>
-            <a:endParaRPr lang="en-US" sz="1599" spc="79">
+            <a:endParaRPr lang="en-US" sz="1599" spc="79" dirty="0">
               <a:solidFill>
                 <a:srgbClr val="191919"/>
               </a:solidFill>
@@ -10516,8 +10672,8 @@
         </p:nvSpPr>
         <p:spPr>
           <a:xfrm>
-            <a:off x="7893608" y="6475227"/>
-            <a:ext cx="2500783" cy="1167765"/>
+            <a:off x="7892853" y="6719991"/>
+            <a:ext cx="2500783" cy="2124684"/>
           </a:xfrm>
           <a:prstGeom prst="rect">
             <a:avLst/>
@@ -10535,7 +10691,7 @@
               </a:lnSpc>
             </a:pPr>
             <a:r>
-              <a:rPr lang="en-US" sz="1599" spc="79">
+              <a:rPr lang="en-US" sz="1599" spc="79" dirty="0">
                 <a:solidFill>
                   <a:srgbClr val="191919"/>
                 </a:solidFill>
@@ -10547,16 +10703,45 @@
           <a:p>
             <a:pPr>
               <a:lnSpc>
-                <a:spcPts val="2400"/>
+                <a:spcPts val="2399"/>
               </a:lnSpc>
             </a:pPr>
-            <a:endParaRPr lang="en-US" sz="1599" spc="79">
+            <a:endParaRPr lang="en-US" sz="1599" spc="79" dirty="0">
               <a:solidFill>
                 <a:srgbClr val="191919"/>
               </a:solidFill>
               <a:latin typeface="Aileron Regular"/>
             </a:endParaRPr>
           </a:p>
+          <a:p>
+            <a:pPr>
+              <a:lnSpc>
+                <a:spcPts val="2399"/>
+              </a:lnSpc>
+            </a:pPr>
+            <a:r>
+              <a:rPr lang="en-US" sz="1599" spc="79" dirty="0">
+                <a:solidFill>
+                  <a:srgbClr val="191919"/>
+                </a:solidFill>
+                <a:latin typeface="Aileron Regular"/>
+              </a:rPr>
+              <a:t>422K rows of genre data with songs</a:t>
+            </a:r>
+          </a:p>
+          <a:p>
+            <a:pPr>
+              <a:lnSpc>
+                <a:spcPts val="2400"/>
+              </a:lnSpc>
+            </a:pPr>
+            <a:endParaRPr lang="en-US" sz="1599" spc="79" dirty="0">
+              <a:solidFill>
+                <a:srgbClr val="191919"/>
+              </a:solidFill>
+              <a:latin typeface="Aileron Regular"/>
+            </a:endParaRPr>
+          </a:p>
         </p:txBody>
       </p:sp>
       <p:sp>
@@ -10568,7 +10753,7 @@
         <p:spPr>
           <a:xfrm>
             <a:off x="14406206" y="6527128"/>
-            <a:ext cx="2629977" cy="1758315"/>
+            <a:ext cx="2629977" cy="2124684"/>
           </a:xfrm>
           <a:prstGeom prst="rect">
             <a:avLst/>
@@ -10588,7 +10773,7 @@
               <a:buChar char="•"/>
             </a:pPr>
             <a:r>
-              <a:rPr lang="en-US" sz="1599" spc="79">
+              <a:rPr lang="en-US" sz="1599" spc="79" dirty="0">
                 <a:solidFill>
                   <a:srgbClr val="E9EEE5"/>
                 </a:solidFill>
@@ -10606,7 +10791,7 @@
               <a:buChar char="•"/>
             </a:pPr>
             <a:r>
-              <a:rPr lang="en-US" sz="1599" spc="79">
+              <a:rPr lang="en-US" sz="1599" spc="79" dirty="0">
                 <a:solidFill>
                   <a:srgbClr val="E9EEE5"/>
                 </a:solidFill>
@@ -10624,7 +10809,7 @@
               <a:buChar char="•"/>
             </a:pPr>
             <a:r>
-              <a:rPr lang="en-US" sz="1599" spc="79">
+              <a:rPr lang="en-US" sz="1599" spc="79" dirty="0">
                 <a:solidFill>
                   <a:srgbClr val="E9EEE5"/>
                 </a:solidFill>
@@ -10642,7 +10827,7 @@
               <a:buChar char="•"/>
             </a:pPr>
             <a:r>
-              <a:rPr lang="en-US" sz="1599" spc="79">
+              <a:rPr lang="en-US" sz="1599" spc="79" dirty="0">
                 <a:solidFill>
                   <a:srgbClr val="E9EEE5"/>
                 </a:solidFill>
@@ -10652,12 +10837,30 @@
             </a:r>
           </a:p>
           <a:p>
+            <a:pPr marL="345439" lvl="1" indent="-172720">
+              <a:lnSpc>
+                <a:spcPts val="2399"/>
+              </a:lnSpc>
+              <a:buFont typeface="Arial"/>
+              <a:buChar char="•"/>
+            </a:pPr>
+            <a:r>
+              <a:rPr lang="en-US" sz="1599" spc="79" dirty="0">
+                <a:solidFill>
+                  <a:srgbClr val="E9EEE5"/>
+                </a:solidFill>
+                <a:latin typeface="Aileron Regular"/>
+              </a:rPr>
+              <a:t>Pickle data files</a:t>
+            </a:r>
+          </a:p>
+          <a:p>
             <a:pPr>
               <a:lnSpc>
                 <a:spcPts val="2400"/>
               </a:lnSpc>
             </a:pPr>
-            <a:endParaRPr lang="en-US" sz="1599" spc="79">
+            <a:endParaRPr lang="en-US" sz="1599" spc="79" dirty="0">
               <a:solidFill>
                 <a:srgbClr val="E9EEE5"/>
               </a:solidFill>
@@ -10675,7 +10878,7 @@
         <p:spPr>
           <a:xfrm>
             <a:off x="11190280" y="6517603"/>
-            <a:ext cx="2629977" cy="1472565"/>
+            <a:ext cx="2629977" cy="2124684"/>
           </a:xfrm>
           <a:prstGeom prst="rect">
             <a:avLst/>
@@ -10693,13 +10896,51 @@
               </a:lnSpc>
             </a:pPr>
             <a:r>
-              <a:rPr lang="en-US" sz="1599" spc="79">
+              <a:rPr lang="en-US" sz="1599" spc="79" dirty="0" err="1">
                 <a:solidFill>
                   <a:srgbClr val="191919"/>
                 </a:solidFill>
                 <a:latin typeface="Aileron Regular"/>
               </a:rPr>
-              <a:t>MusicXMatch dataset containing a list of the 5000 words the most used in the songs in Bag of Word format</a:t>
+              <a:t>MusicXMatch</a:t>
+            </a:r>
+            <a:r>
+              <a:rPr lang="en-US" sz="1599" spc="79" dirty="0">
+                <a:solidFill>
+                  <a:srgbClr val="191919"/>
+                </a:solidFill>
+                <a:latin typeface="Aileron Regular"/>
+              </a:rPr>
+              <a:t> dataset containing a list of the 5000 words the most used in the songs in Bag of Word format</a:t>
+            </a:r>
+          </a:p>
+          <a:p>
+            <a:pPr>
+              <a:lnSpc>
+                <a:spcPts val="2400"/>
+              </a:lnSpc>
+            </a:pPr>
+            <a:endParaRPr lang="en-US" sz="1599" spc="79" dirty="0">
+              <a:solidFill>
+                <a:srgbClr val="191919"/>
+              </a:solidFill>
+              <a:latin typeface="Aileron Regular"/>
+            </a:endParaRPr>
+          </a:p>
+          <a:p>
+            <a:pPr>
+              <a:lnSpc>
+                <a:spcPts val="2400"/>
+              </a:lnSpc>
+            </a:pPr>
+            <a:r>
+              <a:rPr lang="en-US" sz="1599" spc="79" dirty="0">
+                <a:solidFill>
+                  <a:srgbClr val="191919"/>
+                </a:solidFill>
+                <a:latin typeface="Aileron Regular"/>
+              </a:rPr>
+              <a:t>50K song lyrics data </a:t>
             </a:r>
           </a:p>
         </p:txBody>

</xml_diff>